<commit_message>
updated UML and added pdf version
</commit_message>
<xml_diff>
--- a/FootyGame/Football Documentation/Football UML.pptx
+++ b/FootyGame/Football Documentation/Football UML.pptx
@@ -104,7 +104,129 @@
       </a:defRPr>
     </a:lvl9pPr>
   </p:defaultTextStyle>
+  <p:extLst>
+    <p:ext uri="{EFAFB233-063F-42B5-8137-9DF3F51BA10A}">
+      <p15:sldGuideLst xmlns:p15="http://schemas.microsoft.com/office/powerpoint/2012/main"/>
+    </p:ext>
+  </p:extLst>
 </p:presentation>
+</file>
+
+<file path=ppt/revisionInfo.xml><?xml version="1.0" encoding="utf-8"?>
+<p1510:revInfo xmlns:a="http://schemas.openxmlformats.org/drawingml/2006/main" xmlns:r="http://schemas.openxmlformats.org/officeDocument/2006/relationships" xmlns:p1510="http://schemas.microsoft.com/office/powerpoint/2015/10/main">
+  <p1510:revLst>
+    <p1510:client id="{19BD9C00-0F21-4985-8565-593A7085C532}" v="3" dt="2022-07-28T15:36:31.232"/>
+  </p1510:revLst>
+</p1510:revInfo>
+</file>
+
+<file path=ppt/changesInfos/changesInfo1.xml><?xml version="1.0" encoding="utf-8"?>
+<pc:chgInfo xmlns:a="http://schemas.openxmlformats.org/drawingml/2006/main" xmlns:r="http://schemas.openxmlformats.org/officeDocument/2006/relationships" xmlns:ac="http://schemas.microsoft.com/office/drawing/2013/main/command" xmlns:pc="http://schemas.microsoft.com/office/powerpoint/2013/main/command">
+  <pc:docChgLst>
+    <pc:chgData name="Shakir Ali" userId="3ee2113188611cb2" providerId="LiveId" clId="{19BD9C00-0F21-4985-8565-593A7085C532}"/>
+    <pc:docChg chg="undo custSel modSld">
+      <pc:chgData name="Shakir Ali" userId="3ee2113188611cb2" providerId="LiveId" clId="{19BD9C00-0F21-4985-8565-593A7085C532}" dt="2022-07-28T15:38:11.103" v="133" actId="14100"/>
+      <pc:docMkLst>
+        <pc:docMk/>
+      </pc:docMkLst>
+      <pc:sldChg chg="addSp delSp modSp mod">
+        <pc:chgData name="Shakir Ali" userId="3ee2113188611cb2" providerId="LiveId" clId="{19BD9C00-0F21-4985-8565-593A7085C532}" dt="2022-07-28T15:38:11.103" v="133" actId="14100"/>
+        <pc:sldMkLst>
+          <pc:docMk/>
+          <pc:sldMk cId="1641529009" sldId="256"/>
+        </pc:sldMkLst>
+        <pc:spChg chg="mod">
+          <ac:chgData name="Shakir Ali" userId="3ee2113188611cb2" providerId="LiveId" clId="{19BD9C00-0F21-4985-8565-593A7085C532}" dt="2022-07-28T15:38:11.103" v="133" actId="14100"/>
+          <ac:spMkLst>
+            <pc:docMk/>
+            <pc:sldMk cId="1641529009" sldId="256"/>
+            <ac:spMk id="6" creationId="{835937C2-2A46-4CA7-B653-FEB13CEA62DE}"/>
+          </ac:spMkLst>
+        </pc:spChg>
+        <pc:spChg chg="mod">
+          <ac:chgData name="Shakir Ali" userId="3ee2113188611cb2" providerId="LiveId" clId="{19BD9C00-0F21-4985-8565-593A7085C532}" dt="2022-07-28T15:38:05.442" v="132" actId="20577"/>
+          <ac:spMkLst>
+            <pc:docMk/>
+            <pc:sldMk cId="1641529009" sldId="256"/>
+            <ac:spMk id="7" creationId="{EF1C2446-AC15-4B4B-B059-B6252A2CE8F8}"/>
+          </ac:spMkLst>
+        </pc:spChg>
+        <pc:spChg chg="del">
+          <ac:chgData name="Shakir Ali" userId="3ee2113188611cb2" providerId="LiveId" clId="{19BD9C00-0F21-4985-8565-593A7085C532}" dt="2022-07-28T15:37:23.693" v="73" actId="478"/>
+          <ac:spMkLst>
+            <pc:docMk/>
+            <pc:sldMk cId="1641529009" sldId="256"/>
+            <ac:spMk id="10" creationId="{43BF77A9-AA66-49CD-A644-BDBBF0EDBAF6}"/>
+          </ac:spMkLst>
+        </pc:spChg>
+        <pc:spChg chg="add mod">
+          <ac:chgData name="Shakir Ali" userId="3ee2113188611cb2" providerId="LiveId" clId="{19BD9C00-0F21-4985-8565-593A7085C532}" dt="2022-07-28T15:35:35.770" v="16" actId="20577"/>
+          <ac:spMkLst>
+            <pc:docMk/>
+            <pc:sldMk cId="1641529009" sldId="256"/>
+            <ac:spMk id="12" creationId="{0798A7AB-61D7-4F92-B19F-65AF4E3BA8A9}"/>
+          </ac:spMkLst>
+        </pc:spChg>
+        <pc:spChg chg="add del mod">
+          <ac:chgData name="Shakir Ali" userId="3ee2113188611cb2" providerId="LiveId" clId="{19BD9C00-0F21-4985-8565-593A7085C532}" dt="2022-07-28T15:35:29.388" v="2" actId="478"/>
+          <ac:spMkLst>
+            <pc:docMk/>
+            <pc:sldMk cId="1641529009" sldId="256"/>
+            <ac:spMk id="13" creationId="{088C6454-AC66-4C9C-B300-5A1C45129D5F}"/>
+          </ac:spMkLst>
+        </pc:spChg>
+        <pc:spChg chg="add mod">
+          <ac:chgData name="Shakir Ali" userId="3ee2113188611cb2" providerId="LiveId" clId="{19BD9C00-0F21-4985-8565-593A7085C532}" dt="2022-07-28T15:36:27.668" v="53" actId="14100"/>
+          <ac:spMkLst>
+            <pc:docMk/>
+            <pc:sldMk cId="1641529009" sldId="256"/>
+            <ac:spMk id="14" creationId="{39A7B2CB-49F7-4F9E-8827-B4EC958949C1}"/>
+          </ac:spMkLst>
+        </pc:spChg>
+        <pc:spChg chg="add mod">
+          <ac:chgData name="Shakir Ali" userId="3ee2113188611cb2" providerId="LiveId" clId="{19BD9C00-0F21-4985-8565-593A7085C532}" dt="2022-07-28T15:36:17.128" v="52" actId="14100"/>
+          <ac:spMkLst>
+            <pc:docMk/>
+            <pc:sldMk cId="1641529009" sldId="256"/>
+            <ac:spMk id="15" creationId="{A503609B-C158-4B91-AC5B-365D57320850}"/>
+          </ac:spMkLst>
+        </pc:spChg>
+        <pc:spChg chg="add del mod">
+          <ac:chgData name="Shakir Ali" userId="3ee2113188611cb2" providerId="LiveId" clId="{19BD9C00-0F21-4985-8565-593A7085C532}" dt="2022-07-28T15:36:53.287" v="69" actId="1076"/>
+          <ac:spMkLst>
+            <pc:docMk/>
+            <pc:sldMk cId="1641529009" sldId="256"/>
+            <ac:spMk id="16" creationId="{D88D70EB-5A18-495E-9D08-E6B57270CDD1}"/>
+          </ac:spMkLst>
+        </pc:spChg>
+        <pc:spChg chg="add del mod">
+          <ac:chgData name="Shakir Ali" userId="3ee2113188611cb2" providerId="LiveId" clId="{19BD9C00-0F21-4985-8565-593A7085C532}" dt="2022-07-28T15:36:42.128" v="58" actId="478"/>
+          <ac:spMkLst>
+            <pc:docMk/>
+            <pc:sldMk cId="1641529009" sldId="256"/>
+            <ac:spMk id="17" creationId="{51BF9675-C4A2-43C7-A631-A26CBDD255E5}"/>
+          </ac:spMkLst>
+        </pc:spChg>
+        <pc:cxnChg chg="add mod">
+          <ac:chgData name="Shakir Ali" userId="3ee2113188611cb2" providerId="LiveId" clId="{19BD9C00-0F21-4985-8565-593A7085C532}" dt="2022-07-28T15:37:12.183" v="71" actId="13822"/>
+          <ac:cxnSpMkLst>
+            <pc:docMk/>
+            <pc:sldMk cId="1641529009" sldId="256"/>
+            <ac:cxnSpMk id="3" creationId="{58DE5DC6-A1D3-4CBD-B278-8B32BF37A354}"/>
+          </ac:cxnSpMkLst>
+        </pc:cxnChg>
+        <pc:cxnChg chg="del">
+          <ac:chgData name="Shakir Ali" userId="3ee2113188611cb2" providerId="LiveId" clId="{19BD9C00-0F21-4985-8565-593A7085C532}" dt="2022-07-28T15:37:20.857" v="72" actId="478"/>
+          <ac:cxnSpMkLst>
+            <pc:docMk/>
+            <pc:sldMk cId="1641529009" sldId="256"/>
+            <ac:cxnSpMk id="9" creationId="{713B9BCF-7F95-474C-9593-4345E4F6B0BD}"/>
+          </ac:cxnSpMkLst>
+        </pc:cxnChg>
+      </pc:sldChg>
+    </pc:docChg>
+  </pc:docChgLst>
+</pc:chgInfo>
 </file>
 
 <file path=ppt/slideLayouts/slideLayout1.xml><?xml version="1.0" encoding="utf-8"?>
@@ -3455,6 +3577,138 @@
         <p:spPr>
           <a:xfrm>
             <a:off x="5686926" y="2346960"/>
+            <a:ext cx="2667802" cy="369332"/>
+          </a:xfrm>
+          <a:prstGeom prst="rect">
+            <a:avLst/>
+          </a:prstGeom>
+          <a:noFill/>
+          <a:ln>
+            <a:solidFill>
+              <a:schemeClr val="tx1"/>
+            </a:solidFill>
+          </a:ln>
+        </p:spPr>
+        <p:txBody>
+          <a:bodyPr wrap="square" rtlCol="0">
+            <a:spAutoFit/>
+          </a:bodyPr>
+          <a:lstStyle/>
+          <a:p>
+            <a:r>
+              <a:rPr lang="en-GB" dirty="0"/>
+              <a:t>Footballer Controller</a:t>
+            </a:r>
+          </a:p>
+        </p:txBody>
+      </p:sp>
+      <p:sp>
+        <p:nvSpPr>
+          <p:cNvPr id="7" name="TextBox 6">
+            <a:extLst>
+              <a:ext uri="{FF2B5EF4-FFF2-40B4-BE49-F238E27FC236}">
+                <a16:creationId xmlns:a16="http://schemas.microsoft.com/office/drawing/2014/main" id="{EF1C2446-AC15-4B4B-B059-B6252A2CE8F8}"/>
+              </a:ext>
+            </a:extLst>
+          </p:cNvPr>
+          <p:cNvSpPr txBox="1"/>
+          <p:nvPr/>
+        </p:nvSpPr>
+        <p:spPr>
+          <a:xfrm>
+            <a:off x="5686925" y="2724495"/>
+            <a:ext cx="2667803" cy="646331"/>
+          </a:xfrm>
+          <a:prstGeom prst="rect">
+            <a:avLst/>
+          </a:prstGeom>
+          <a:noFill/>
+          <a:ln>
+            <a:solidFill>
+              <a:schemeClr val="tx1"/>
+            </a:solidFill>
+          </a:ln>
+        </p:spPr>
+        <p:txBody>
+          <a:bodyPr wrap="square" rtlCol="0">
+            <a:spAutoFit/>
+          </a:bodyPr>
+          <a:lstStyle/>
+          <a:p>
+            <a:r>
+              <a:rPr lang="en-GB" dirty="0"/>
+              <a:t>-Service: </a:t>
+            </a:r>
+            <a:r>
+              <a:rPr lang="en-GB" dirty="0" err="1"/>
+              <a:t>FootballerService</a:t>
+            </a:r>
+            <a:endParaRPr lang="en-GB" dirty="0"/>
+          </a:p>
+          <a:p>
+            <a:r>
+              <a:rPr lang="en-GB" dirty="0"/>
+              <a:t>-Repo: </a:t>
+            </a:r>
+            <a:r>
+              <a:rPr lang="en-GB" dirty="0" err="1"/>
+              <a:t>FootballerRepo</a:t>
+            </a:r>
+            <a:endParaRPr lang="en-GB" dirty="0"/>
+          </a:p>
+        </p:txBody>
+      </p:sp>
+      <p:sp>
+        <p:nvSpPr>
+          <p:cNvPr id="11" name="TextBox 10">
+            <a:extLst>
+              <a:ext uri="{FF2B5EF4-FFF2-40B4-BE49-F238E27FC236}">
+                <a16:creationId xmlns:a16="http://schemas.microsoft.com/office/drawing/2014/main" id="{F97DD916-44CD-4884-AABC-F1082DC5DA23}"/>
+              </a:ext>
+            </a:extLst>
+          </p:cNvPr>
+          <p:cNvSpPr txBox="1"/>
+          <p:nvPr/>
+        </p:nvSpPr>
+        <p:spPr>
+          <a:xfrm>
+            <a:off x="3031154" y="1172861"/>
+            <a:ext cx="3773103" cy="461665"/>
+          </a:xfrm>
+          <a:prstGeom prst="rect">
+            <a:avLst/>
+          </a:prstGeom>
+          <a:noFill/>
+        </p:spPr>
+        <p:txBody>
+          <a:bodyPr wrap="square" rtlCol="0">
+            <a:spAutoFit/>
+          </a:bodyPr>
+          <a:lstStyle/>
+          <a:p>
+            <a:pPr algn="ctr"/>
+            <a:r>
+              <a:rPr lang="en-GB" sz="2400" dirty="0"/>
+              <a:t>UML Diagram</a:t>
+            </a:r>
+          </a:p>
+        </p:txBody>
+      </p:sp>
+      <p:sp>
+        <p:nvSpPr>
+          <p:cNvPr id="12" name="TextBox 11">
+            <a:extLst>
+              <a:ext uri="{FF2B5EF4-FFF2-40B4-BE49-F238E27FC236}">
+                <a16:creationId xmlns:a16="http://schemas.microsoft.com/office/drawing/2014/main" id="{0798A7AB-61D7-4F92-B19F-65AF4E3BA8A9}"/>
+              </a:ext>
+            </a:extLst>
+          </p:cNvPr>
+          <p:cNvSpPr txBox="1"/>
+          <p:nvPr/>
+        </p:nvSpPr>
+        <p:spPr>
+          <a:xfrm>
+            <a:off x="4799798" y="3647594"/>
             <a:ext cx="2215415" cy="369332"/>
           </a:xfrm>
           <a:prstGeom prst="rect">
@@ -3475,17 +3729,17 @@
           <a:p>
             <a:r>
               <a:rPr lang="en-GB" dirty="0"/>
-              <a:t>Footballer Controller</a:t>
-            </a:r>
-          </a:p>
-        </p:txBody>
-      </p:sp>
-      <p:sp>
-        <p:nvSpPr>
-          <p:cNvPr id="7" name="TextBox 6">
-            <a:extLst>
-              <a:ext uri="{FF2B5EF4-FFF2-40B4-BE49-F238E27FC236}">
-                <a16:creationId xmlns:a16="http://schemas.microsoft.com/office/drawing/2014/main" id="{EF1C2446-AC15-4B4B-B059-B6252A2CE8F8}"/>
+              <a:t>Footballer Repo</a:t>
+            </a:r>
+          </a:p>
+        </p:txBody>
+      </p:sp>
+      <p:sp>
+        <p:nvSpPr>
+          <p:cNvPr id="14" name="TextBox 13">
+            <a:extLst>
+              <a:ext uri="{FF2B5EF4-FFF2-40B4-BE49-F238E27FC236}">
+                <a16:creationId xmlns:a16="http://schemas.microsoft.com/office/drawing/2014/main" id="{39A7B2CB-49F7-4F9E-8827-B4EC958949C1}"/>
               </a:ext>
             </a:extLst>
           </p:cNvPr>
@@ -3494,7 +3748,93 @@
         </p:nvSpPr>
         <p:spPr>
           <a:xfrm>
-            <a:off x="5686925" y="2724495"/>
+            <a:off x="2403107" y="4828674"/>
+            <a:ext cx="2313272" cy="368963"/>
+          </a:xfrm>
+          <a:prstGeom prst="rect">
+            <a:avLst/>
+          </a:prstGeom>
+          <a:noFill/>
+          <a:ln>
+            <a:solidFill>
+              <a:schemeClr val="tx1"/>
+            </a:solidFill>
+          </a:ln>
+        </p:spPr>
+        <p:txBody>
+          <a:bodyPr wrap="square" rtlCol="0">
+            <a:spAutoFit/>
+          </a:bodyPr>
+          <a:lstStyle/>
+          <a:p>
+            <a:r>
+              <a:rPr lang="en-GB" dirty="0" err="1"/>
+              <a:t>FootballerServiceDB</a:t>
+            </a:r>
+            <a:endParaRPr lang="en-GB" dirty="0"/>
+          </a:p>
+        </p:txBody>
+      </p:sp>
+      <p:sp>
+        <p:nvSpPr>
+          <p:cNvPr id="15" name="TextBox 14">
+            <a:extLst>
+              <a:ext uri="{FF2B5EF4-FFF2-40B4-BE49-F238E27FC236}">
+                <a16:creationId xmlns:a16="http://schemas.microsoft.com/office/drawing/2014/main" id="{A503609B-C158-4B91-AC5B-365D57320850}"/>
+              </a:ext>
+            </a:extLst>
+          </p:cNvPr>
+          <p:cNvSpPr txBox="1"/>
+          <p:nvPr/>
+        </p:nvSpPr>
+        <p:spPr>
+          <a:xfrm>
+            <a:off x="2403106" y="5206209"/>
+            <a:ext cx="2313273" cy="369332"/>
+          </a:xfrm>
+          <a:prstGeom prst="rect">
+            <a:avLst/>
+          </a:prstGeom>
+          <a:noFill/>
+          <a:ln>
+            <a:solidFill>
+              <a:schemeClr val="tx1"/>
+            </a:solidFill>
+          </a:ln>
+        </p:spPr>
+        <p:txBody>
+          <a:bodyPr wrap="square" rtlCol="0">
+            <a:spAutoFit/>
+          </a:bodyPr>
+          <a:lstStyle/>
+          <a:p>
+            <a:r>
+              <a:rPr lang="en-GB" dirty="0"/>
+              <a:t>-Repo: </a:t>
+            </a:r>
+            <a:r>
+              <a:rPr lang="en-GB" dirty="0" err="1"/>
+              <a:t>FootballerRepo</a:t>
+            </a:r>
+            <a:endParaRPr lang="en-GB" dirty="0"/>
+          </a:p>
+        </p:txBody>
+      </p:sp>
+      <p:sp>
+        <p:nvSpPr>
+          <p:cNvPr id="16" name="TextBox 15">
+            <a:extLst>
+              <a:ext uri="{FF2B5EF4-FFF2-40B4-BE49-F238E27FC236}">
+                <a16:creationId xmlns:a16="http://schemas.microsoft.com/office/drawing/2014/main" id="{D88D70EB-5A18-495E-9D08-E6B57270CDD1}"/>
+              </a:ext>
+            </a:extLst>
+          </p:cNvPr>
+          <p:cNvSpPr txBox="1"/>
+          <p:nvPr/>
+        </p:nvSpPr>
+        <p:spPr>
+          <a:xfrm>
+            <a:off x="5598694" y="5021543"/>
             <a:ext cx="2215415" cy="369332"/>
           </a:xfrm>
           <a:prstGeom prst="rect">
@@ -3514,32 +3854,38 @@
           <a:lstStyle/>
           <a:p>
             <a:r>
-              <a:rPr lang="en-GB" dirty="0"/>
-              <a:t>-List: Footballers</a:t>
-            </a:r>
+              <a:rPr lang="en-GB" dirty="0" err="1"/>
+              <a:t>FootballerService</a:t>
+            </a:r>
+            <a:endParaRPr lang="en-GB" dirty="0"/>
           </a:p>
         </p:txBody>
       </p:sp>
       <p:cxnSp>
         <p:nvCxnSpPr>
-          <p:cNvPr id="9" name="Straight Connector 8">
-            <a:extLst>
-              <a:ext uri="{FF2B5EF4-FFF2-40B4-BE49-F238E27FC236}">
-                <a16:creationId xmlns:a16="http://schemas.microsoft.com/office/drawing/2014/main" id="{713B9BCF-7F95-474C-9593-4345E4F6B0BD}"/>
-              </a:ext>
-            </a:extLst>
-          </p:cNvPr>
-          <p:cNvCxnSpPr/>
+          <p:cNvPr id="3" name="Straight Arrow Connector 2">
+            <a:extLst>
+              <a:ext uri="{FF2B5EF4-FFF2-40B4-BE49-F238E27FC236}">
+                <a16:creationId xmlns:a16="http://schemas.microsoft.com/office/drawing/2014/main" id="{58DE5DC6-A1D3-4CBD-B278-8B32BF37A354}"/>
+              </a:ext>
+            </a:extLst>
+          </p:cNvPr>
+          <p:cNvCxnSpPr>
+            <a:endCxn id="16" idx="1"/>
+          </p:cNvCxnSpPr>
           <p:nvPr/>
         </p:nvCxnSpPr>
         <p:spPr>
           <a:xfrm>
-            <a:off x="4148487" y="2829827"/>
-            <a:ext cx="1538438" cy="0"/>
+            <a:off x="4716379" y="5206209"/>
+            <a:ext cx="882315" cy="0"/>
           </a:xfrm>
-          <a:prstGeom prst="line">
+          <a:prstGeom prst="straightConnector1">
             <a:avLst/>
           </a:prstGeom>
+          <a:ln>
+            <a:tailEnd type="triangle"/>
+          </a:ln>
         </p:spPr>
         <p:style>
           <a:lnRef idx="1">
@@ -3556,77 +3902,6 @@
           </a:fontRef>
         </p:style>
       </p:cxnSp>
-      <p:sp>
-        <p:nvSpPr>
-          <p:cNvPr id="10" name="TextBox 9">
-            <a:extLst>
-              <a:ext uri="{FF2B5EF4-FFF2-40B4-BE49-F238E27FC236}">
-                <a16:creationId xmlns:a16="http://schemas.microsoft.com/office/drawing/2014/main" id="{43BF77A9-AA66-49CD-A644-BDBBF0EDBAF6}"/>
-              </a:ext>
-            </a:extLst>
-          </p:cNvPr>
-          <p:cNvSpPr txBox="1"/>
-          <p:nvPr/>
-        </p:nvSpPr>
-        <p:spPr>
-          <a:xfrm>
-            <a:off x="4148487" y="2459434"/>
-            <a:ext cx="336884" cy="369332"/>
-          </a:xfrm>
-          <a:prstGeom prst="rect">
-            <a:avLst/>
-          </a:prstGeom>
-          <a:noFill/>
-        </p:spPr>
-        <p:txBody>
-          <a:bodyPr wrap="square" rtlCol="0">
-            <a:spAutoFit/>
-          </a:bodyPr>
-          <a:lstStyle/>
-          <a:p>
-            <a:r>
-              <a:rPr lang="en-GB" dirty="0"/>
-              <a:t>1</a:t>
-            </a:r>
-          </a:p>
-        </p:txBody>
-      </p:sp>
-      <p:sp>
-        <p:nvSpPr>
-          <p:cNvPr id="11" name="TextBox 10">
-            <a:extLst>
-              <a:ext uri="{FF2B5EF4-FFF2-40B4-BE49-F238E27FC236}">
-                <a16:creationId xmlns:a16="http://schemas.microsoft.com/office/drawing/2014/main" id="{F97DD916-44CD-4884-AABC-F1082DC5DA23}"/>
-              </a:ext>
-            </a:extLst>
-          </p:cNvPr>
-          <p:cNvSpPr txBox="1"/>
-          <p:nvPr/>
-        </p:nvSpPr>
-        <p:spPr>
-          <a:xfrm>
-            <a:off x="3031154" y="1172861"/>
-            <a:ext cx="3773103" cy="461665"/>
-          </a:xfrm>
-          <a:prstGeom prst="rect">
-            <a:avLst/>
-          </a:prstGeom>
-          <a:noFill/>
-        </p:spPr>
-        <p:txBody>
-          <a:bodyPr wrap="square" rtlCol="0">
-            <a:spAutoFit/>
-          </a:bodyPr>
-          <a:lstStyle/>
-          <a:p>
-            <a:pPr algn="ctr"/>
-            <a:r>
-              <a:rPr lang="en-GB" sz="2400" dirty="0"/>
-              <a:t>UML Diagram</a:t>
-            </a:r>
-          </a:p>
-        </p:txBody>
-      </p:sp>
     </p:spTree>
     <p:extLst>
       <p:ext uri="{BB962C8B-B14F-4D97-AF65-F5344CB8AC3E}">

</xml_diff>